<commit_message>
Improve slide on Lazy streams
</commit_message>
<xml_diff>
--- a/24-streams-lazy/lec.pptx
+++ b/24-streams-lazy/lec.pptx
@@ -28,7 +28,7 @@
     <p:sldId id="481" r:id="rId19"/>
     <p:sldId id="473" r:id="rId20"/>
     <p:sldId id="495" r:id="rId21"/>
-    <p:sldId id="483" r:id="rId22"/>
+    <p:sldId id="547" r:id="rId22"/>
     <p:sldId id="546" r:id="rId23"/>
   </p:sldIdLst>
   <p:sldSz cx="9144000" cy="6858000" type="screen4x3"/>
@@ -229,7 +229,7 @@
           <a:p>
             <a:fld id="{5367F125-181F-9A48-A24E-AAD89CB055B5}" type="datetimeFigureOut">
               <a:rPr lang="en-US" smtClean="0"/>
-              <a:t>11/25/19</a:t>
+              <a:t>11/26/19</a:t>
             </a:fld>
             <a:endParaRPr lang="en-US"/>
           </a:p>
@@ -3752,6 +3752,129 @@
           <a:bodyPr/>
           <a:lstStyle/>
           <a:p>
+            <a:r>
+              <a:rPr lang="en-US" dirty="0"/>
+              <a:t>Can implement streams with </a:t>
+            </a:r>
+            <a:r>
+              <a:rPr lang="en-US" b="1" dirty="0">
+                <a:latin typeface="Courier" pitchFamily="2" charset="0"/>
+              </a:rPr>
+              <a:t>Lazy</a:t>
+            </a:r>
+            <a:endParaRPr lang="en-US" b="1" dirty="0">
+              <a:solidFill>
+                <a:schemeClr val="tx1">
+                  <a:lumMod val="50000"/>
+                  <a:lumOff val="50000"/>
+                </a:schemeClr>
+              </a:solidFill>
+              <a:latin typeface="Courier" pitchFamily="2" charset="0"/>
+            </a:endParaRPr>
+          </a:p>
+          <a:p>
+            <a:r>
+              <a:rPr lang="en-US" dirty="0"/>
+              <a:t>See textbook section on Laziness for re-implementation of stream functions using this type</a:t>
+            </a:r>
+          </a:p>
+          <a:p>
+            <a:r>
+              <a:rPr lang="en-US" b="1" dirty="0"/>
+              <a:t>  </a:t>
+            </a:r>
+            <a:r>
+              <a:rPr lang="en-US" b="0" dirty="0"/>
+              <a:t>(but, there’s nothing deep:  just using [lazy] and [force] instead of functions </a:t>
+            </a:r>
+            <a:r>
+              <a:rPr lang="en-US" b="0"/>
+              <a:t>and application</a:t>
+            </a:r>
+            <a:endParaRPr lang="en-US" b="1" dirty="0"/>
+          </a:p>
+        </p:txBody>
+      </p:sp>
+      <p:sp>
+        <p:nvSpPr>
+          <p:cNvPr id="4" name="Slide Number Placeholder 3"/>
+          <p:cNvSpPr>
+            <a:spLocks noGrp="1"/>
+          </p:cNvSpPr>
+          <p:nvPr>
+            <p:ph type="sldNum" sz="quarter" idx="5"/>
+          </p:nvPr>
+        </p:nvSpPr>
+        <p:spPr/>
+        <p:txBody>
+          <a:bodyPr/>
+          <a:lstStyle/>
+          <a:p>
+            <a:fld id="{B7975FD5-AB21-4C45-BFE8-1D3F02B463E2}" type="slidenum">
+              <a:rPr lang="en-US" smtClean="0"/>
+              <a:t>21</a:t>
+            </a:fld>
+            <a:endParaRPr lang="en-US"/>
+          </a:p>
+        </p:txBody>
+      </p:sp>
+    </p:spTree>
+    <p:extLst>
+      <p:ext uri="{BB962C8B-B14F-4D97-AF65-F5344CB8AC3E}">
+        <p14:creationId xmlns:p14="http://schemas.microsoft.com/office/powerpoint/2010/main" val="3805920573"/>
+      </p:ext>
+    </p:extLst>
+  </p:cSld>
+  <p:clrMapOvr>
+    <a:masterClrMapping/>
+  </p:clrMapOvr>
+</p:notes>
+</file>
+
+<file path=ppt/notesSlides/notesSlide15.xml><?xml version="1.0" encoding="utf-8"?>
+<p:notes xmlns:a="http://schemas.openxmlformats.org/drawingml/2006/main" xmlns:r="http://schemas.openxmlformats.org/officeDocument/2006/relationships" xmlns:p="http://schemas.openxmlformats.org/presentationml/2006/main">
+  <p:cSld>
+    <p:spTree>
+      <p:nvGrpSpPr>
+        <p:cNvPr id="1" name=""/>
+        <p:cNvGrpSpPr/>
+        <p:nvPr/>
+      </p:nvGrpSpPr>
+      <p:grpSpPr>
+        <a:xfrm>
+          <a:off x="0" y="0"/>
+          <a:ext cx="0" cy="0"/>
+          <a:chOff x="0" y="0"/>
+          <a:chExt cx="0" cy="0"/>
+        </a:xfrm>
+      </p:grpSpPr>
+      <p:sp>
+        <p:nvSpPr>
+          <p:cNvPr id="2" name="Slide Image Placeholder 1"/>
+          <p:cNvSpPr>
+            <a:spLocks noGrp="1" noRot="1" noChangeAspect="1"/>
+          </p:cNvSpPr>
+          <p:nvPr>
+            <p:ph type="sldImg"/>
+          </p:nvPr>
+        </p:nvSpPr>
+        <p:spPr/>
+      </p:sp>
+      <p:sp>
+        <p:nvSpPr>
+          <p:cNvPr id="3" name="Notes Placeholder 2"/>
+          <p:cNvSpPr>
+            <a:spLocks noGrp="1"/>
+          </p:cNvSpPr>
+          <p:nvPr>
+            <p:ph type="body" idx="1"/>
+          </p:nvPr>
+        </p:nvSpPr>
+        <p:spPr/>
+        <p:txBody>
+          <a:bodyPr/>
+          <a:lstStyle/>
+          <a:p>
             <a:endParaRPr lang="en-US" dirty="0"/>
           </a:p>
         </p:txBody>
@@ -6073,7 +6196,7 @@
           <a:p>
             <a:fld id="{96331252-4874-F047-84B8-3D3EF8743E79}" type="datetimeFigureOut">
               <a:rPr lang="en-US" smtClean="0"/>
-              <a:t>11/25/19</a:t>
+              <a:t>11/26/19</a:t>
             </a:fld>
             <a:endParaRPr lang="en-US"/>
           </a:p>
@@ -6340,7 +6463,7 @@
           <a:p>
             <a:fld id="{96331252-4874-F047-84B8-3D3EF8743E79}" type="datetimeFigureOut">
               <a:rPr lang="en-US" smtClean="0"/>
-              <a:t>11/25/19</a:t>
+              <a:t>11/26/19</a:t>
             </a:fld>
             <a:endParaRPr lang="en-US"/>
           </a:p>
@@ -6518,7 +6641,7 @@
           <a:p>
             <a:fld id="{96331252-4874-F047-84B8-3D3EF8743E79}" type="datetimeFigureOut">
               <a:rPr lang="en-US" smtClean="0"/>
-              <a:t>11/25/19</a:t>
+              <a:t>11/26/19</a:t>
             </a:fld>
             <a:endParaRPr lang="en-US"/>
           </a:p>
@@ -6694,7 +6817,7 @@
           <a:p>
             <a:fld id="{96331252-4874-F047-84B8-3D3EF8743E79}" type="datetimeFigureOut">
               <a:rPr lang="en-US" smtClean="0"/>
-              <a:t>11/25/19</a:t>
+              <a:t>11/26/19</a:t>
             </a:fld>
             <a:endParaRPr lang="en-US"/>
           </a:p>
@@ -6943,7 +7066,7 @@
           <a:p>
             <a:fld id="{96331252-4874-F047-84B8-3D3EF8743E79}" type="datetimeFigureOut">
               <a:rPr lang="en-US" smtClean="0"/>
-              <a:t>11/25/19</a:t>
+              <a:t>11/26/19</a:t>
             </a:fld>
             <a:endParaRPr lang="en-US"/>
           </a:p>
@@ -7228,7 +7351,7 @@
           <a:p>
             <a:fld id="{96331252-4874-F047-84B8-3D3EF8743E79}" type="datetimeFigureOut">
               <a:rPr lang="en-US" smtClean="0"/>
-              <a:t>11/25/19</a:t>
+              <a:t>11/26/19</a:t>
             </a:fld>
             <a:endParaRPr lang="en-US"/>
           </a:p>
@@ -7647,7 +7770,7 @@
           <a:p>
             <a:fld id="{96331252-4874-F047-84B8-3D3EF8743E79}" type="datetimeFigureOut">
               <a:rPr lang="en-US" smtClean="0"/>
-              <a:t>11/25/19</a:t>
+              <a:t>11/26/19</a:t>
             </a:fld>
             <a:endParaRPr lang="en-US"/>
           </a:p>
@@ -7764,7 +7887,7 @@
           <a:p>
             <a:fld id="{96331252-4874-F047-84B8-3D3EF8743E79}" type="datetimeFigureOut">
               <a:rPr lang="en-US" smtClean="0"/>
-              <a:t>11/25/19</a:t>
+              <a:t>11/26/19</a:t>
             </a:fld>
             <a:endParaRPr lang="en-US"/>
           </a:p>
@@ -7859,7 +7982,7 @@
           <a:p>
             <a:fld id="{96331252-4874-F047-84B8-3D3EF8743E79}" type="datetimeFigureOut">
               <a:rPr lang="en-US" smtClean="0"/>
-              <a:t>11/25/19</a:t>
+              <a:t>11/26/19</a:t>
             </a:fld>
             <a:endParaRPr lang="en-US"/>
           </a:p>
@@ -8134,7 +8257,7 @@
           <a:p>
             <a:fld id="{96331252-4874-F047-84B8-3D3EF8743E79}" type="datetimeFigureOut">
               <a:rPr lang="en-US" smtClean="0"/>
-              <a:t>11/25/19</a:t>
+              <a:t>11/26/19</a:t>
             </a:fld>
             <a:endParaRPr lang="en-US"/>
           </a:p>
@@ -8386,7 +8509,7 @@
           <a:p>
             <a:fld id="{96331252-4874-F047-84B8-3D3EF8743E79}" type="datetimeFigureOut">
               <a:rPr lang="en-US" smtClean="0"/>
-              <a:t>11/25/19</a:t>
+              <a:t>11/26/19</a:t>
             </a:fld>
             <a:endParaRPr lang="en-US"/>
           </a:p>
@@ -8600,7 +8723,7 @@
             <a:fld id="{96331252-4874-F047-84B8-3D3EF8743E79}" type="datetimeFigureOut">
               <a:rPr lang="en-US" smtClean="0"/>
               <a:pPr/>
-              <a:t>11/25/19</a:t>
+              <a:t>11/26/19</a:t>
             </a:fld>
             <a:endParaRPr lang="en-US"/>
           </a:p>
@@ -12890,7 +13013,13 @@
       </p:grpSpPr>
       <p:sp>
         <p:nvSpPr>
-          <p:cNvPr id="2" name="Title 1"/>
+          <p:cNvPr id="2" name="Title 1">
+            <a:extLst>
+              <a:ext uri="{FF2B5EF4-FFF2-40B4-BE49-F238E27FC236}">
+                <a16:creationId xmlns:a16="http://schemas.microsoft.com/office/drawing/2014/main" id="{A4423AB5-6CFB-2744-B6FD-AB52468F3228}"/>
+              </a:ext>
+            </a:extLst>
+          </p:cNvPr>
           <p:cNvSpPr>
             <a:spLocks noGrp="1"/>
           </p:cNvSpPr>
@@ -12905,14 +13034,20 @@
           <a:p>
             <a:r>
               <a:rPr lang="en-US" dirty="0"/>
-              <a:t>Streams and laziness</a:t>
+              <a:t>Stream and laziness</a:t>
             </a:r>
           </a:p>
         </p:txBody>
       </p:sp>
       <p:sp>
         <p:nvSpPr>
-          <p:cNvPr id="3" name="Content Placeholder 2"/>
+          <p:cNvPr id="3" name="Content Placeholder 2">
+            <a:extLst>
+              <a:ext uri="{FF2B5EF4-FFF2-40B4-BE49-F238E27FC236}">
+                <a16:creationId xmlns:a16="http://schemas.microsoft.com/office/drawing/2014/main" id="{709FFF76-07FE-A946-B397-E7FBAE041986}"/>
+              </a:ext>
+            </a:extLst>
+          </p:cNvPr>
           <p:cNvSpPr>
             <a:spLocks noGrp="1"/>
           </p:cNvSpPr>
@@ -12927,45 +13062,373 @@
           </a:bodyPr>
           <a:lstStyle/>
           <a:p>
-            <a:r>
-              <a:rPr lang="en-US" dirty="0"/>
-              <a:t>Can implement streams with </a:t>
-            </a:r>
-            <a:r>
-              <a:rPr lang="en-US" b="1" dirty="0">
+            <a:pPr marL="0" indent="0">
+              <a:buNone/>
+            </a:pPr>
+            <a:r>
+              <a:rPr lang="en-US" sz="2800" b="1" dirty="0">
+                <a:solidFill>
+                  <a:srgbClr val="6B0001"/>
+                </a:solidFill>
                 <a:latin typeface="Courier" pitchFamily="2" charset="0"/>
               </a:rPr>
-              <a:t>Lazy</a:t>
-            </a:r>
-            <a:endParaRPr lang="en-US" b="1" dirty="0">
+              <a:t>type</a:t>
+            </a:r>
+            <a:r>
+              <a:rPr lang="en-US" sz="2800" dirty="0">
+                <a:solidFill>
+                  <a:srgbClr val="000000"/>
+                </a:solidFill>
+                <a:latin typeface="Courier" pitchFamily="2" charset="0"/>
+              </a:rPr>
+              <a:t> </a:t>
+            </a:r>
+            <a:r>
+              <a:rPr lang="en-US" sz="2800" dirty="0">
+                <a:solidFill>
+                  <a:srgbClr val="6D6F24"/>
+                </a:solidFill>
+                <a:latin typeface="Courier" pitchFamily="2" charset="0"/>
+              </a:rPr>
+              <a:t>'</a:t>
+            </a:r>
+            <a:r>
+              <a:rPr lang="en-US" sz="2800" dirty="0">
+                <a:solidFill>
+                  <a:srgbClr val="000000"/>
+                </a:solidFill>
+                <a:latin typeface="Courier" pitchFamily="2" charset="0"/>
+              </a:rPr>
+              <a:t>a stream </a:t>
+            </a:r>
+            <a:r>
+              <a:rPr lang="en-US" sz="2800" dirty="0">
+                <a:solidFill>
+                  <a:srgbClr val="6D6F24"/>
+                </a:solidFill>
+                <a:latin typeface="Courier" pitchFamily="2" charset="0"/>
+              </a:rPr>
+              <a:t>=</a:t>
+            </a:r>
+            <a:endParaRPr lang="en-US" sz="2800" dirty="0">
               <a:solidFill>
-                <a:schemeClr val="tx1">
-                  <a:lumMod val="50000"/>
-                  <a:lumOff val="50000"/>
-                </a:schemeClr>
+                <a:srgbClr val="000000"/>
               </a:solidFill>
               <a:latin typeface="Courier" pitchFamily="2" charset="0"/>
             </a:endParaRPr>
           </a:p>
           <a:p>
-            <a:r>
-              <a:rPr lang="en-US" dirty="0"/>
-              <a:t>See textbook exercise </a:t>
-            </a:r>
-            <a:r>
-              <a:rPr lang="en-US" b="1" dirty="0"/>
-              <a:t>lazy stream</a:t>
-            </a:r>
-          </a:p>
-          <a:p>
-            <a:endParaRPr lang="en-US" dirty="0"/>
+            <a:pPr marL="0" indent="0">
+              <a:buNone/>
+            </a:pPr>
+            <a:r>
+              <a:rPr lang="en-US" sz="2800" dirty="0">
+                <a:solidFill>
+                  <a:srgbClr val="000000"/>
+                </a:solidFill>
+                <a:latin typeface="Courier" pitchFamily="2" charset="0"/>
+              </a:rPr>
+              <a:t>  Cons </a:t>
+            </a:r>
+            <a:r>
+              <a:rPr lang="en-US" sz="2800" b="1" dirty="0">
+                <a:solidFill>
+                  <a:srgbClr val="6B0001"/>
+                </a:solidFill>
+                <a:latin typeface="Courier" pitchFamily="2" charset="0"/>
+              </a:rPr>
+              <a:t>of</a:t>
+            </a:r>
+            <a:r>
+              <a:rPr lang="en-US" sz="2800" dirty="0">
+                <a:solidFill>
+                  <a:srgbClr val="000000"/>
+                </a:solidFill>
+                <a:latin typeface="Courier" pitchFamily="2" charset="0"/>
+              </a:rPr>
+              <a:t> </a:t>
+            </a:r>
+            <a:r>
+              <a:rPr lang="en-US" sz="2800" dirty="0">
+                <a:solidFill>
+                  <a:srgbClr val="6D6F24"/>
+                </a:solidFill>
+                <a:latin typeface="Courier" pitchFamily="2" charset="0"/>
+              </a:rPr>
+              <a:t>'</a:t>
+            </a:r>
+            <a:r>
+              <a:rPr lang="en-US" sz="2800" dirty="0">
+                <a:solidFill>
+                  <a:srgbClr val="000000"/>
+                </a:solidFill>
+                <a:latin typeface="Courier" pitchFamily="2" charset="0"/>
+              </a:rPr>
+              <a:t>a </a:t>
+            </a:r>
+            <a:r>
+              <a:rPr lang="en-US" sz="2800" dirty="0">
+                <a:solidFill>
+                  <a:srgbClr val="6D6F24"/>
+                </a:solidFill>
+                <a:latin typeface="Courier" pitchFamily="2" charset="0"/>
+              </a:rPr>
+              <a:t>*</a:t>
+            </a:r>
+            <a:r>
+              <a:rPr lang="en-US" sz="2800" dirty="0">
+                <a:solidFill>
+                  <a:srgbClr val="000000"/>
+                </a:solidFill>
+                <a:latin typeface="Courier" pitchFamily="2" charset="0"/>
+              </a:rPr>
+              <a:t> </a:t>
+            </a:r>
+            <a:r>
+              <a:rPr lang="en-US" sz="2800" dirty="0">
+                <a:solidFill>
+                  <a:srgbClr val="6D6F24"/>
+                </a:solidFill>
+                <a:latin typeface="Courier" charset="0"/>
+              </a:rPr>
+              <a:t>'</a:t>
+            </a:r>
+            <a:r>
+              <a:rPr lang="en-US" sz="2800" dirty="0">
+                <a:solidFill>
+                  <a:srgbClr val="000000"/>
+                </a:solidFill>
+                <a:latin typeface="Courier" charset="0"/>
+              </a:rPr>
+              <a:t>a stream </a:t>
+            </a:r>
+            <a:r>
+              <a:rPr lang="en-US" sz="2800" dirty="0" err="1">
+                <a:solidFill>
+                  <a:schemeClr val="accent6"/>
+                </a:solidFill>
+                <a:latin typeface="Courier" pitchFamily="2" charset="0"/>
+              </a:rPr>
+              <a:t>Lazy.t</a:t>
+            </a:r>
+            <a:endParaRPr lang="en-US" sz="2800" dirty="0">
+              <a:solidFill>
+                <a:schemeClr val="accent6"/>
+              </a:solidFill>
+              <a:latin typeface="Courier" pitchFamily="2" charset="0"/>
+            </a:endParaRPr>
+          </a:p>
+          <a:p>
+            <a:pPr marL="0" indent="0">
+              <a:buNone/>
+            </a:pPr>
+            <a:endParaRPr lang="en-US" sz="2800" dirty="0"/>
+          </a:p>
+          <a:p>
+            <a:pPr marL="0" indent="0">
+              <a:buNone/>
+            </a:pPr>
+            <a:r>
+              <a:rPr lang="en-US" sz="2800" dirty="0"/>
+              <a:t>vs</a:t>
+            </a:r>
+          </a:p>
+          <a:p>
+            <a:pPr marL="0" indent="0">
+              <a:buNone/>
+            </a:pPr>
+            <a:endParaRPr lang="en-US" sz="2800" dirty="0"/>
+          </a:p>
+          <a:p>
+            <a:pPr marL="0" indent="0">
+              <a:buNone/>
+            </a:pPr>
+            <a:r>
+              <a:rPr lang="en-US" sz="2800" b="1" dirty="0">
+                <a:solidFill>
+                  <a:srgbClr val="6B0001"/>
+                </a:solidFill>
+                <a:latin typeface="Courier-Bold" charset="0"/>
+              </a:rPr>
+              <a:t>type</a:t>
+            </a:r>
+            <a:r>
+              <a:rPr lang="en-US" sz="2800" dirty="0">
+                <a:solidFill>
+                  <a:srgbClr val="000000"/>
+                </a:solidFill>
+                <a:latin typeface="Courier" charset="0"/>
+              </a:rPr>
+              <a:t> </a:t>
+            </a:r>
+            <a:r>
+              <a:rPr lang="en-US" sz="2800" dirty="0">
+                <a:solidFill>
+                  <a:srgbClr val="6D6F24"/>
+                </a:solidFill>
+                <a:latin typeface="Courier" charset="0"/>
+              </a:rPr>
+              <a:t>'</a:t>
+            </a:r>
+            <a:r>
+              <a:rPr lang="en-US" sz="2800" dirty="0">
+                <a:solidFill>
+                  <a:srgbClr val="000000"/>
+                </a:solidFill>
+                <a:latin typeface="Courier" charset="0"/>
+              </a:rPr>
+              <a:t>a stream </a:t>
+            </a:r>
+            <a:r>
+              <a:rPr lang="en-US" sz="2800" dirty="0">
+                <a:solidFill>
+                  <a:srgbClr val="6D6F24"/>
+                </a:solidFill>
+                <a:latin typeface="Courier" charset="0"/>
+              </a:rPr>
+              <a:t>=</a:t>
+            </a:r>
+            <a:endParaRPr lang="en-US" sz="2800" dirty="0">
+              <a:solidFill>
+                <a:srgbClr val="000000"/>
+              </a:solidFill>
+              <a:latin typeface="Courier" charset="0"/>
+            </a:endParaRPr>
+          </a:p>
+          <a:p>
+            <a:pPr marL="0" indent="0">
+              <a:buNone/>
+            </a:pPr>
+            <a:r>
+              <a:rPr lang="en-US" sz="2800" dirty="0">
+                <a:solidFill>
+                  <a:srgbClr val="000000"/>
+                </a:solidFill>
+                <a:latin typeface="Courier" charset="0"/>
+              </a:rPr>
+              <a:t>  Cons </a:t>
+            </a:r>
+            <a:r>
+              <a:rPr lang="en-US" sz="2800" b="1" dirty="0">
+                <a:solidFill>
+                  <a:srgbClr val="6B0001"/>
+                </a:solidFill>
+                <a:latin typeface="Courier-Bold" charset="0"/>
+              </a:rPr>
+              <a:t>of</a:t>
+            </a:r>
+            <a:r>
+              <a:rPr lang="en-US" sz="2800" dirty="0">
+                <a:solidFill>
+                  <a:srgbClr val="000000"/>
+                </a:solidFill>
+                <a:latin typeface="Courier" charset="0"/>
+              </a:rPr>
+              <a:t> </a:t>
+            </a:r>
+            <a:r>
+              <a:rPr lang="en-US" sz="2800" dirty="0">
+                <a:solidFill>
+                  <a:srgbClr val="6D6F24"/>
+                </a:solidFill>
+                <a:latin typeface="Courier" charset="0"/>
+              </a:rPr>
+              <a:t>'</a:t>
+            </a:r>
+            <a:r>
+              <a:rPr lang="en-US" sz="2800" dirty="0">
+                <a:solidFill>
+                  <a:srgbClr val="000000"/>
+                </a:solidFill>
+                <a:latin typeface="Courier" charset="0"/>
+              </a:rPr>
+              <a:t>a </a:t>
+            </a:r>
+            <a:r>
+              <a:rPr lang="en-US" sz="2800" dirty="0">
+                <a:solidFill>
+                  <a:srgbClr val="6D6F24"/>
+                </a:solidFill>
+                <a:latin typeface="Courier" charset="0"/>
+              </a:rPr>
+              <a:t>*</a:t>
+            </a:r>
+            <a:r>
+              <a:rPr lang="en-US" sz="2800" dirty="0">
+                <a:solidFill>
+                  <a:srgbClr val="000000"/>
+                </a:solidFill>
+                <a:latin typeface="Courier" charset="0"/>
+              </a:rPr>
+              <a:t> </a:t>
+            </a:r>
+            <a:r>
+              <a:rPr lang="en-US" sz="2800" dirty="0">
+                <a:solidFill>
+                  <a:schemeClr val="accent6"/>
+                </a:solidFill>
+                <a:latin typeface="Courier" charset="0"/>
+              </a:rPr>
+              <a:t>(</a:t>
+            </a:r>
+            <a:r>
+              <a:rPr lang="en-US" sz="2800" b="1" dirty="0">
+                <a:solidFill>
+                  <a:schemeClr val="accent6"/>
+                </a:solidFill>
+                <a:latin typeface="Courier-Bold" charset="0"/>
+              </a:rPr>
+              <a:t>unit</a:t>
+            </a:r>
+            <a:r>
+              <a:rPr lang="en-US" sz="2800" dirty="0">
+                <a:solidFill>
+                  <a:schemeClr val="accent6"/>
+                </a:solidFill>
+                <a:latin typeface="Courier" charset="0"/>
+              </a:rPr>
+              <a:t> -&gt; </a:t>
+            </a:r>
+            <a:r>
+              <a:rPr lang="en-US" sz="2800" dirty="0">
+                <a:solidFill>
+                  <a:srgbClr val="6D6F24"/>
+                </a:solidFill>
+                <a:latin typeface="Courier" charset="0"/>
+              </a:rPr>
+              <a:t>'</a:t>
+            </a:r>
+            <a:r>
+              <a:rPr lang="en-US" sz="2800" dirty="0">
+                <a:solidFill>
+                  <a:srgbClr val="000000"/>
+                </a:solidFill>
+                <a:latin typeface="Courier" charset="0"/>
+              </a:rPr>
+              <a:t>a stream</a:t>
+            </a:r>
+            <a:r>
+              <a:rPr lang="en-US" sz="2800" dirty="0">
+                <a:solidFill>
+                  <a:schemeClr val="accent6"/>
+                </a:solidFill>
+                <a:latin typeface="Courier" charset="0"/>
+              </a:rPr>
+              <a:t>)</a:t>
+            </a:r>
+          </a:p>
+          <a:p>
+            <a:pPr marL="0" indent="0">
+              <a:buNone/>
+            </a:pPr>
+            <a:endParaRPr lang="en-US" sz="2800" dirty="0"/>
           </a:p>
         </p:txBody>
       </p:sp>
     </p:spTree>
     <p:extLst>
       <p:ext uri="{BB962C8B-B14F-4D97-AF65-F5344CB8AC3E}">
-        <p14:creationId xmlns:p14="http://schemas.microsoft.com/office/powerpoint/2010/main" val="3146775433"/>
+        <p14:creationId xmlns:p14="http://schemas.microsoft.com/office/powerpoint/2010/main" val="2256095183"/>
       </p:ext>
     </p:extLst>
   </p:cSld>

</xml_diff>